<commit_message>
Finished work on paper and presentation
</commit_message>
<xml_diff>
--- a/Ognjen Stamenkovic - Minimum Steiner Tree.pptx
+++ b/Ognjen Stamenkovic - Minimum Steiner Tree.pptx
@@ -116,6 +116,11 @@
       </a:defRPr>
     </a:lvl9pPr>
   </p:defaultTextStyle>
+  <p:extLst>
+    <p:ext uri="{EFAFB233-063F-42B5-8137-9DF3F51BA10A}">
+      <p15:sldGuideLst xmlns:p15="http://schemas.microsoft.com/office/powerpoint/2012/main"/>
+    </p:ext>
+  </p:extLst>
 </p:presentation>
 </file>
 
@@ -169,7 +174,7 @@
           <a:noFill/>
           <a:extLst>
             <a:ext uri="{909E8E84-426E-40dd-AFC4-6F175D3DCCD1}">
-              <a14:hiddenFill xmlns:a14="http://schemas.microsoft.com/office/drawing/2010/main" xmlns="">
+              <a14:hiddenFill xmlns="" xmlns:a14="http://schemas.microsoft.com/office/drawing/2010/main">
                 <a:solidFill>
                   <a:srgbClr val="FFFFFF"/>
                 </a:solidFill>
@@ -229,7 +234,7 @@
             </a:ln>
             <a:extLst>
               <a:ext uri="{91240B29-F687-4f45-9708-019B960494DF}">
-                <a14:hiddenLine xmlns:a14="http://schemas.microsoft.com/office/drawing/2010/main" xmlns="" w="9525">
+                <a14:hiddenLine xmlns="" xmlns:a14="http://schemas.microsoft.com/office/drawing/2010/main" w="9525">
                   <a:solidFill>
                     <a:srgbClr val="000000"/>
                   </a:solidFill>
@@ -319,7 +324,7 @@
             </a:ln>
             <a:extLst>
               <a:ext uri="{91240B29-F687-4f45-9708-019B960494DF}">
-                <a14:hiddenLine xmlns:a14="http://schemas.microsoft.com/office/drawing/2010/main" xmlns="" w="9525">
+                <a14:hiddenLine xmlns="" xmlns:a14="http://schemas.microsoft.com/office/drawing/2010/main" w="9525">
                   <a:solidFill>
                     <a:srgbClr val="000000"/>
                   </a:solidFill>
@@ -409,7 +414,7 @@
             </a:ln>
             <a:extLst>
               <a:ext uri="{91240B29-F687-4f45-9708-019B960494DF}">
-                <a14:hiddenLine xmlns:a14="http://schemas.microsoft.com/office/drawing/2010/main" xmlns="" w="9525">
+                <a14:hiddenLine xmlns="" xmlns:a14="http://schemas.microsoft.com/office/drawing/2010/main" w="9525">
                   <a:solidFill>
                     <a:srgbClr val="000000"/>
                   </a:solidFill>
@@ -443,7 +448,7 @@
             </a:ln>
             <a:extLst>
               <a:ext uri="{91240B29-F687-4f45-9708-019B960494DF}">
-                <a14:hiddenLine xmlns:a14="http://schemas.microsoft.com/office/drawing/2010/main" xmlns="" w="9525">
+                <a14:hiddenLine xmlns="" xmlns:a14="http://schemas.microsoft.com/office/drawing/2010/main" w="9525">
                   <a:solidFill>
                     <a:srgbClr val="000000"/>
                   </a:solidFill>
@@ -533,7 +538,7 @@
             </a:ln>
             <a:extLst>
               <a:ext uri="{91240B29-F687-4f45-9708-019B960494DF}">
-                <a14:hiddenLine xmlns:a14="http://schemas.microsoft.com/office/drawing/2010/main" xmlns="" w="9525">
+                <a14:hiddenLine xmlns="" xmlns:a14="http://schemas.microsoft.com/office/drawing/2010/main" w="9525">
                   <a:solidFill>
                     <a:srgbClr val="000000"/>
                   </a:solidFill>
@@ -595,7 +600,7 @@
             </a:ln>
             <a:extLst>
               <a:ext uri="{91240B29-F687-4f45-9708-019B960494DF}">
-                <a14:hiddenLine xmlns:a14="http://schemas.microsoft.com/office/drawing/2010/main" xmlns="" w="9525">
+                <a14:hiddenLine xmlns="" xmlns:a14="http://schemas.microsoft.com/office/drawing/2010/main" w="9525">
                   <a:solidFill>
                     <a:srgbClr val="000000"/>
                   </a:solidFill>
@@ -657,7 +662,7 @@
             </a:ln>
             <a:extLst>
               <a:ext uri="{91240B29-F687-4f45-9708-019B960494DF}">
-                <a14:hiddenLine xmlns:a14="http://schemas.microsoft.com/office/drawing/2010/main" xmlns="" w="9525">
+                <a14:hiddenLine xmlns="" xmlns:a14="http://schemas.microsoft.com/office/drawing/2010/main" w="9525">
                   <a:solidFill>
                     <a:srgbClr val="000000"/>
                   </a:solidFill>
@@ -747,7 +752,7 @@
             </a:ln>
             <a:extLst>
               <a:ext uri="{91240B29-F687-4f45-9708-019B960494DF}">
-                <a14:hiddenLine xmlns:a14="http://schemas.microsoft.com/office/drawing/2010/main" xmlns="" w="9525">
+                <a14:hiddenLine xmlns="" xmlns:a14="http://schemas.microsoft.com/office/drawing/2010/main" w="9525">
                   <a:solidFill>
                     <a:srgbClr val="000000"/>
                   </a:solidFill>
@@ -809,7 +814,7 @@
             </a:ln>
             <a:extLst>
               <a:ext uri="{91240B29-F687-4f45-9708-019B960494DF}">
-                <a14:hiddenLine xmlns:a14="http://schemas.microsoft.com/office/drawing/2010/main" xmlns="" w="9525">
+                <a14:hiddenLine xmlns="" xmlns:a14="http://schemas.microsoft.com/office/drawing/2010/main" w="9525">
                   <a:solidFill>
                     <a:srgbClr val="000000"/>
                   </a:solidFill>
@@ -871,7 +876,7 @@
             </a:ln>
             <a:extLst>
               <a:ext uri="{91240B29-F687-4f45-9708-019B960494DF}">
-                <a14:hiddenLine xmlns:a14="http://schemas.microsoft.com/office/drawing/2010/main" xmlns="" w="9525">
+                <a14:hiddenLine xmlns="" xmlns:a14="http://schemas.microsoft.com/office/drawing/2010/main" w="9525">
                   <a:solidFill>
                     <a:srgbClr val="000000"/>
                   </a:solidFill>
@@ -961,7 +966,7 @@
             </a:ln>
             <a:extLst>
               <a:ext uri="{91240B29-F687-4f45-9708-019B960494DF}">
-                <a14:hiddenLine xmlns:a14="http://schemas.microsoft.com/office/drawing/2010/main" xmlns="" w="9525">
+                <a14:hiddenLine xmlns="" xmlns:a14="http://schemas.microsoft.com/office/drawing/2010/main" w="9525">
                   <a:solidFill>
                     <a:srgbClr val="000000"/>
                   </a:solidFill>
@@ -1051,7 +1056,7 @@
             </a:ln>
             <a:extLst>
               <a:ext uri="{91240B29-F687-4f45-9708-019B960494DF}">
-                <a14:hiddenLine xmlns:a14="http://schemas.microsoft.com/office/drawing/2010/main" xmlns="" w="9525">
+                <a14:hiddenLine xmlns="" xmlns:a14="http://schemas.microsoft.com/office/drawing/2010/main" w="9525">
                   <a:solidFill>
                     <a:srgbClr val="000000"/>
                   </a:solidFill>
@@ -1113,7 +1118,7 @@
             </a:ln>
             <a:extLst>
               <a:ext uri="{91240B29-F687-4f45-9708-019B960494DF}">
-                <a14:hiddenLine xmlns:a14="http://schemas.microsoft.com/office/drawing/2010/main" xmlns="" w="9525">
+                <a14:hiddenLine xmlns="" xmlns:a14="http://schemas.microsoft.com/office/drawing/2010/main" w="9525">
                   <a:solidFill>
                     <a:srgbClr val="000000"/>
                   </a:solidFill>
@@ -1223,7 +1228,7 @@
             </a:ln>
             <a:extLst>
               <a:ext uri="{91240B29-F687-4f45-9708-019B960494DF}">
-                <a14:hiddenLine xmlns:a14="http://schemas.microsoft.com/office/drawing/2010/main" xmlns="" w="9525">
+                <a14:hiddenLine xmlns="" xmlns:a14="http://schemas.microsoft.com/office/drawing/2010/main" w="9525">
                   <a:solidFill>
                     <a:srgbClr val="000000"/>
                   </a:solidFill>
@@ -1285,7 +1290,7 @@
             </a:ln>
             <a:extLst>
               <a:ext uri="{91240B29-F687-4f45-9708-019B960494DF}">
-                <a14:hiddenLine xmlns:a14="http://schemas.microsoft.com/office/drawing/2010/main" xmlns="" w="9525">
+                <a14:hiddenLine xmlns="" xmlns:a14="http://schemas.microsoft.com/office/drawing/2010/main" w="9525">
                   <a:solidFill>
                     <a:srgbClr val="000000"/>
                   </a:solidFill>
@@ -1375,7 +1380,7 @@
             </a:ln>
             <a:extLst>
               <a:ext uri="{91240B29-F687-4f45-9708-019B960494DF}">
-                <a14:hiddenLine xmlns:a14="http://schemas.microsoft.com/office/drawing/2010/main" xmlns="" w="9525">
+                <a14:hiddenLine xmlns="" xmlns:a14="http://schemas.microsoft.com/office/drawing/2010/main" w="9525">
                   <a:solidFill>
                     <a:srgbClr val="000000"/>
                   </a:solidFill>
@@ -1465,7 +1470,7 @@
             </a:ln>
             <a:extLst>
               <a:ext uri="{91240B29-F687-4f45-9708-019B960494DF}">
-                <a14:hiddenLine xmlns:a14="http://schemas.microsoft.com/office/drawing/2010/main" xmlns="" w="9525">
+                <a14:hiddenLine xmlns="" xmlns:a14="http://schemas.microsoft.com/office/drawing/2010/main" w="9525">
                   <a:solidFill>
                     <a:srgbClr val="000000"/>
                   </a:solidFill>
@@ -1527,7 +1532,7 @@
             </a:ln>
             <a:extLst>
               <a:ext uri="{91240B29-F687-4f45-9708-019B960494DF}">
-                <a14:hiddenLine xmlns:a14="http://schemas.microsoft.com/office/drawing/2010/main" xmlns="" w="9525">
+                <a14:hiddenLine xmlns="" xmlns:a14="http://schemas.microsoft.com/office/drawing/2010/main" w="9525">
                   <a:solidFill>
                     <a:srgbClr val="000000"/>
                   </a:solidFill>
@@ -1617,7 +1622,7 @@
             </a:ln>
             <a:extLst>
               <a:ext uri="{91240B29-F687-4f45-9708-019B960494DF}">
-                <a14:hiddenLine xmlns:a14="http://schemas.microsoft.com/office/drawing/2010/main" xmlns="" w="9525">
+                <a14:hiddenLine xmlns="" xmlns:a14="http://schemas.microsoft.com/office/drawing/2010/main" w="9525">
                   <a:solidFill>
                     <a:srgbClr val="000000"/>
                   </a:solidFill>
@@ -1707,7 +1712,7 @@
             </a:ln>
             <a:extLst>
               <a:ext uri="{91240B29-F687-4f45-9708-019B960494DF}">
-                <a14:hiddenLine xmlns:a14="http://schemas.microsoft.com/office/drawing/2010/main" xmlns="" w="9525">
+                <a14:hiddenLine xmlns="" xmlns:a14="http://schemas.microsoft.com/office/drawing/2010/main" w="9525">
                   <a:solidFill>
                     <a:srgbClr val="000000"/>
                   </a:solidFill>
@@ -1763,7 +1768,7 @@
             </a:ln>
             <a:extLst>
               <a:ext uri="{91240B29-F687-4f45-9708-019B960494DF}">
-                <a14:hiddenLine xmlns:a14="http://schemas.microsoft.com/office/drawing/2010/main" xmlns="" w="9525">
+                <a14:hiddenLine xmlns="" xmlns:a14="http://schemas.microsoft.com/office/drawing/2010/main" w="9525">
                   <a:solidFill>
                     <a:srgbClr val="000000"/>
                   </a:solidFill>
@@ -1853,7 +1858,7 @@
             </a:ln>
             <a:extLst>
               <a:ext uri="{91240B29-F687-4f45-9708-019B960494DF}">
-                <a14:hiddenLine xmlns:a14="http://schemas.microsoft.com/office/drawing/2010/main" xmlns="" w="9525">
+                <a14:hiddenLine xmlns="" xmlns:a14="http://schemas.microsoft.com/office/drawing/2010/main" w="9525">
                   <a:solidFill>
                     <a:srgbClr val="000000"/>
                   </a:solidFill>
@@ -1909,7 +1914,7 @@
             </a:ln>
             <a:extLst>
               <a:ext uri="{91240B29-F687-4f45-9708-019B960494DF}">
-                <a14:hiddenLine xmlns:a14="http://schemas.microsoft.com/office/drawing/2010/main" xmlns="" w="9525">
+                <a14:hiddenLine xmlns="" xmlns:a14="http://schemas.microsoft.com/office/drawing/2010/main" w="9525">
                   <a:solidFill>
                     <a:srgbClr val="000000"/>
                   </a:solidFill>
@@ -1999,7 +2004,7 @@
             </a:ln>
             <a:extLst>
               <a:ext uri="{91240B29-F687-4f45-9708-019B960494DF}">
-                <a14:hiddenLine xmlns:a14="http://schemas.microsoft.com/office/drawing/2010/main" xmlns="" w="9525">
+                <a14:hiddenLine xmlns="" xmlns:a14="http://schemas.microsoft.com/office/drawing/2010/main" w="9525">
                   <a:solidFill>
                     <a:srgbClr val="000000"/>
                   </a:solidFill>
@@ -2067,7 +2072,7 @@
             </a:ln>
             <a:extLst>
               <a:ext uri="{91240B29-F687-4f45-9708-019B960494DF}">
-                <a14:hiddenLine xmlns:a14="http://schemas.microsoft.com/office/drawing/2010/main" xmlns="" w="9525">
+                <a14:hiddenLine xmlns="" xmlns:a14="http://schemas.microsoft.com/office/drawing/2010/main" w="9525">
                   <a:solidFill>
                     <a:srgbClr val="000000"/>
                   </a:solidFill>
@@ -2157,7 +2162,7 @@
             </a:ln>
             <a:extLst>
               <a:ext uri="{91240B29-F687-4f45-9708-019B960494DF}">
-                <a14:hiddenLine xmlns:a14="http://schemas.microsoft.com/office/drawing/2010/main" xmlns="" w="9525">
+                <a14:hiddenLine xmlns="" xmlns:a14="http://schemas.microsoft.com/office/drawing/2010/main" w="9525">
                   <a:solidFill>
                     <a:srgbClr val="000000"/>
                   </a:solidFill>
@@ -2225,7 +2230,7 @@
             </a:ln>
             <a:extLst>
               <a:ext uri="{91240B29-F687-4f45-9708-019B960494DF}">
-                <a14:hiddenLine xmlns:a14="http://schemas.microsoft.com/office/drawing/2010/main" xmlns="" w="9525">
+                <a14:hiddenLine xmlns="" xmlns:a14="http://schemas.microsoft.com/office/drawing/2010/main" w="9525">
                   <a:solidFill>
                     <a:srgbClr val="000000"/>
                   </a:solidFill>
@@ -2315,7 +2320,7 @@
             </a:ln>
             <a:extLst>
               <a:ext uri="{91240B29-F687-4f45-9708-019B960494DF}">
-                <a14:hiddenLine xmlns:a14="http://schemas.microsoft.com/office/drawing/2010/main" xmlns="" w="9525">
+                <a14:hiddenLine xmlns="" xmlns:a14="http://schemas.microsoft.com/office/drawing/2010/main" w="9525">
                   <a:solidFill>
                     <a:srgbClr val="000000"/>
                   </a:solidFill>
@@ -2349,7 +2354,7 @@
             </a:ln>
             <a:extLst>
               <a:ext uri="{91240B29-F687-4f45-9708-019B960494DF}">
-                <a14:hiddenLine xmlns:a14="http://schemas.microsoft.com/office/drawing/2010/main" xmlns="" w="9525">
+                <a14:hiddenLine xmlns="" xmlns:a14="http://schemas.microsoft.com/office/drawing/2010/main" w="9525">
                   <a:solidFill>
                     <a:srgbClr val="000000"/>
                   </a:solidFill>
@@ -2439,7 +2444,7 @@
             </a:ln>
             <a:extLst>
               <a:ext uri="{91240B29-F687-4f45-9708-019B960494DF}">
-                <a14:hiddenLine xmlns:a14="http://schemas.microsoft.com/office/drawing/2010/main" xmlns="" w="9525">
+                <a14:hiddenLine xmlns="" xmlns:a14="http://schemas.microsoft.com/office/drawing/2010/main" w="9525">
                   <a:solidFill>
                     <a:srgbClr val="000000"/>
                   </a:solidFill>
@@ -2501,7 +2506,7 @@
             </a:ln>
             <a:extLst>
               <a:ext uri="{91240B29-F687-4f45-9708-019B960494DF}">
-                <a14:hiddenLine xmlns:a14="http://schemas.microsoft.com/office/drawing/2010/main" xmlns="" w="9525">
+                <a14:hiddenLine xmlns="" xmlns:a14="http://schemas.microsoft.com/office/drawing/2010/main" w="9525">
                   <a:solidFill>
                     <a:srgbClr val="000000"/>
                   </a:solidFill>
@@ -2563,7 +2568,7 @@
             </a:ln>
             <a:extLst>
               <a:ext uri="{91240B29-F687-4f45-9708-019B960494DF}">
-                <a14:hiddenLine xmlns:a14="http://schemas.microsoft.com/office/drawing/2010/main" xmlns="" w="9525">
+                <a14:hiddenLine xmlns="" xmlns:a14="http://schemas.microsoft.com/office/drawing/2010/main" w="9525">
                   <a:solidFill>
                     <a:srgbClr val="000000"/>
                   </a:solidFill>
@@ -2653,7 +2658,7 @@
             </a:ln>
             <a:extLst>
               <a:ext uri="{91240B29-F687-4f45-9708-019B960494DF}">
-                <a14:hiddenLine xmlns:a14="http://schemas.microsoft.com/office/drawing/2010/main" xmlns="" w="9525">
+                <a14:hiddenLine xmlns="" xmlns:a14="http://schemas.microsoft.com/office/drawing/2010/main" w="9525">
                   <a:solidFill>
                     <a:srgbClr val="000000"/>
                   </a:solidFill>
@@ -2721,7 +2726,7 @@
             </a:ln>
             <a:extLst>
               <a:ext uri="{91240B29-F687-4f45-9708-019B960494DF}">
-                <a14:hiddenLine xmlns:a14="http://schemas.microsoft.com/office/drawing/2010/main" xmlns="" w="9525">
+                <a14:hiddenLine xmlns="" xmlns:a14="http://schemas.microsoft.com/office/drawing/2010/main" w="9525">
                   <a:solidFill>
                     <a:srgbClr val="000000"/>
                   </a:solidFill>
@@ -2783,7 +2788,7 @@
             </a:ln>
             <a:extLst>
               <a:ext uri="{91240B29-F687-4f45-9708-019B960494DF}">
-                <a14:hiddenLine xmlns:a14="http://schemas.microsoft.com/office/drawing/2010/main" xmlns="" w="9525">
+                <a14:hiddenLine xmlns="" xmlns:a14="http://schemas.microsoft.com/office/drawing/2010/main" w="9525">
                   <a:solidFill>
                     <a:srgbClr val="000000"/>
                   </a:solidFill>
@@ -2873,7 +2878,7 @@
             </a:ln>
             <a:extLst>
               <a:ext uri="{91240B29-F687-4f45-9708-019B960494DF}">
-                <a14:hiddenLine xmlns:a14="http://schemas.microsoft.com/office/drawing/2010/main" xmlns="" w="9525">
+                <a14:hiddenLine xmlns="" xmlns:a14="http://schemas.microsoft.com/office/drawing/2010/main" w="9525">
                   <a:solidFill>
                     <a:srgbClr val="000000"/>
                   </a:solidFill>
@@ -2935,7 +2940,7 @@
             </a:ln>
             <a:extLst>
               <a:ext uri="{91240B29-F687-4f45-9708-019B960494DF}">
-                <a14:hiddenLine xmlns:a14="http://schemas.microsoft.com/office/drawing/2010/main" xmlns="" w="9525">
+                <a14:hiddenLine xmlns="" xmlns:a14="http://schemas.microsoft.com/office/drawing/2010/main" w="9525">
                   <a:solidFill>
                     <a:srgbClr val="000000"/>
                   </a:solidFill>
@@ -3025,7 +3030,7 @@
             </a:ln>
             <a:extLst>
               <a:ext uri="{91240B29-F687-4f45-9708-019B960494DF}">
-                <a14:hiddenLine xmlns:a14="http://schemas.microsoft.com/office/drawing/2010/main" xmlns="" w="9525">
+                <a14:hiddenLine xmlns="" xmlns:a14="http://schemas.microsoft.com/office/drawing/2010/main" w="9525">
                   <a:solidFill>
                     <a:srgbClr val="000000"/>
                   </a:solidFill>
@@ -3087,7 +3092,7 @@
             </a:ln>
             <a:extLst>
               <a:ext uri="{91240B29-F687-4f45-9708-019B960494DF}">
-                <a14:hiddenLine xmlns:a14="http://schemas.microsoft.com/office/drawing/2010/main" xmlns="" w="9525">
+                <a14:hiddenLine xmlns="" xmlns:a14="http://schemas.microsoft.com/office/drawing/2010/main" w="9525">
                   <a:solidFill>
                     <a:srgbClr val="000000"/>
                   </a:solidFill>
@@ -3177,7 +3182,7 @@
             </a:ln>
             <a:extLst>
               <a:ext uri="{91240B29-F687-4f45-9708-019B960494DF}">
-                <a14:hiddenLine xmlns:a14="http://schemas.microsoft.com/office/drawing/2010/main" xmlns="" w="9525">
+                <a14:hiddenLine xmlns="" xmlns:a14="http://schemas.microsoft.com/office/drawing/2010/main" w="9525">
                   <a:solidFill>
                     <a:srgbClr val="000000"/>
                   </a:solidFill>
@@ -3211,7 +3216,7 @@
             </a:ln>
             <a:extLst>
               <a:ext uri="{91240B29-F687-4f45-9708-019B960494DF}">
-                <a14:hiddenLine xmlns:a14="http://schemas.microsoft.com/office/drawing/2010/main" xmlns="" w="9525">
+                <a14:hiddenLine xmlns="" xmlns:a14="http://schemas.microsoft.com/office/drawing/2010/main" w="9525">
                   <a:solidFill>
                     <a:srgbClr val="000000"/>
                   </a:solidFill>
@@ -3276,7 +3281,7 @@
             </a:ln>
             <a:extLst>
               <a:ext uri="{91240B29-F687-4f45-9708-019B960494DF}">
-                <a14:hiddenLine xmlns:a14="http://schemas.microsoft.com/office/drawing/2010/main" xmlns="" w="9525">
+                <a14:hiddenLine xmlns="" xmlns:a14="http://schemas.microsoft.com/office/drawing/2010/main" w="9525">
                   <a:solidFill>
                     <a:srgbClr val="000000"/>
                   </a:solidFill>
@@ -3366,7 +3371,7 @@
             </a:ln>
             <a:extLst>
               <a:ext uri="{91240B29-F687-4f45-9708-019B960494DF}">
-                <a14:hiddenLine xmlns:a14="http://schemas.microsoft.com/office/drawing/2010/main" xmlns="" w="9525">
+                <a14:hiddenLine xmlns="" xmlns:a14="http://schemas.microsoft.com/office/drawing/2010/main" w="9525">
                   <a:solidFill>
                     <a:srgbClr val="000000"/>
                   </a:solidFill>
@@ -3428,7 +3433,7 @@
             </a:ln>
             <a:extLst>
               <a:ext uri="{91240B29-F687-4f45-9708-019B960494DF}">
-                <a14:hiddenLine xmlns:a14="http://schemas.microsoft.com/office/drawing/2010/main" xmlns="" w="9525">
+                <a14:hiddenLine xmlns="" xmlns:a14="http://schemas.microsoft.com/office/drawing/2010/main" w="9525">
                   <a:solidFill>
                     <a:srgbClr val="000000"/>
                   </a:solidFill>
@@ -3518,7 +3523,7 @@
             </a:ln>
             <a:extLst>
               <a:ext uri="{91240B29-F687-4f45-9708-019B960494DF}">
-                <a14:hiddenLine xmlns:a14="http://schemas.microsoft.com/office/drawing/2010/main" xmlns="" w="9525">
+                <a14:hiddenLine xmlns="" xmlns:a14="http://schemas.microsoft.com/office/drawing/2010/main" w="9525">
                   <a:solidFill>
                     <a:srgbClr val="000000"/>
                   </a:solidFill>
@@ -3608,7 +3613,7 @@
             </a:ln>
             <a:extLst>
               <a:ext uri="{91240B29-F687-4f45-9708-019B960494DF}">
-                <a14:hiddenLine xmlns:a14="http://schemas.microsoft.com/office/drawing/2010/main" xmlns="" w="9525">
+                <a14:hiddenLine xmlns="" xmlns:a14="http://schemas.microsoft.com/office/drawing/2010/main" w="9525">
                   <a:solidFill>
                     <a:srgbClr val="000000"/>
                   </a:solidFill>
@@ -3673,7 +3678,7 @@
             </a:ln>
             <a:extLst>
               <a:ext uri="{91240B29-F687-4f45-9708-019B960494DF}">
-                <a14:hiddenLine xmlns:a14="http://schemas.microsoft.com/office/drawing/2010/main" xmlns="" w="9525">
+                <a14:hiddenLine xmlns="" xmlns:a14="http://schemas.microsoft.com/office/drawing/2010/main" w="9525">
                   <a:solidFill>
                     <a:srgbClr val="000000"/>
                   </a:solidFill>
@@ -3735,7 +3740,7 @@
             </a:ln>
             <a:extLst>
               <a:ext uri="{91240B29-F687-4f45-9708-019B960494DF}">
-                <a14:hiddenLine xmlns:a14="http://schemas.microsoft.com/office/drawing/2010/main" xmlns="" w="9525">
+                <a14:hiddenLine xmlns="" xmlns:a14="http://schemas.microsoft.com/office/drawing/2010/main" w="9525">
                   <a:solidFill>
                     <a:srgbClr val="000000"/>
                   </a:solidFill>
@@ -3825,7 +3830,7 @@
             </a:ln>
             <a:extLst>
               <a:ext uri="{91240B29-F687-4f45-9708-019B960494DF}">
-                <a14:hiddenLine xmlns:a14="http://schemas.microsoft.com/office/drawing/2010/main" xmlns="" w="9525">
+                <a14:hiddenLine xmlns="" xmlns:a14="http://schemas.microsoft.com/office/drawing/2010/main" w="9525">
                   <a:solidFill>
                     <a:srgbClr val="000000"/>
                   </a:solidFill>
@@ -3915,7 +3920,7 @@
             </a:ln>
             <a:extLst>
               <a:ext uri="{91240B29-F687-4f45-9708-019B960494DF}">
-                <a14:hiddenLine xmlns:a14="http://schemas.microsoft.com/office/drawing/2010/main" xmlns="" w="9525">
+                <a14:hiddenLine xmlns="" xmlns:a14="http://schemas.microsoft.com/office/drawing/2010/main" w="9525">
                   <a:solidFill>
                     <a:srgbClr val="000000"/>
                   </a:solidFill>
@@ -3977,7 +3982,7 @@
             </a:ln>
             <a:extLst>
               <a:ext uri="{91240B29-F687-4f45-9708-019B960494DF}">
-                <a14:hiddenLine xmlns:a14="http://schemas.microsoft.com/office/drawing/2010/main" xmlns="" w="9525">
+                <a14:hiddenLine xmlns="" xmlns:a14="http://schemas.microsoft.com/office/drawing/2010/main" w="9525">
                   <a:solidFill>
                     <a:srgbClr val="000000"/>
                   </a:solidFill>
@@ -4097,7 +4102,7 @@
             </a:ln>
             <a:extLst>
               <a:ext uri="{91240B29-F687-4f45-9708-019B960494DF}">
-                <a14:hiddenLine xmlns:a14="http://schemas.microsoft.com/office/drawing/2010/main" xmlns="" w="9525">
+                <a14:hiddenLine xmlns="" xmlns:a14="http://schemas.microsoft.com/office/drawing/2010/main" w="9525">
                   <a:solidFill>
                     <a:srgbClr val="000000"/>
                   </a:solidFill>
@@ -4165,7 +4170,7 @@
             </a:ln>
             <a:extLst>
               <a:ext uri="{91240B29-F687-4f45-9708-019B960494DF}">
-                <a14:hiddenLine xmlns:a14="http://schemas.microsoft.com/office/drawing/2010/main" xmlns="" w="9525">
+                <a14:hiddenLine xmlns="" xmlns:a14="http://schemas.microsoft.com/office/drawing/2010/main" w="9525">
                   <a:solidFill>
                     <a:srgbClr val="000000"/>
                   </a:solidFill>
@@ -4255,7 +4260,7 @@
             </a:ln>
             <a:extLst>
               <a:ext uri="{91240B29-F687-4f45-9708-019B960494DF}">
-                <a14:hiddenLine xmlns:a14="http://schemas.microsoft.com/office/drawing/2010/main" xmlns="" w="9525">
+                <a14:hiddenLine xmlns="" xmlns:a14="http://schemas.microsoft.com/office/drawing/2010/main" w="9525">
                   <a:solidFill>
                     <a:srgbClr val="000000"/>
                   </a:solidFill>
@@ -4395,7 +4400,7 @@
           <a:p>
             <a:fld id="{691886E3-3C4E-4C73-96E9-00403812F84C}" type="datetimeFigureOut">
               <a:rPr lang="en-US" smtClean="0"/>
-              <a:t>9/21/2021</a:t>
+              <a:t>9/22/2021</a:t>
             </a:fld>
             <a:endParaRPr lang="en-US"/>
           </a:p>
@@ -4662,7 +4667,7 @@
           <a:p>
             <a:fld id="{691886E3-3C4E-4C73-96E9-00403812F84C}" type="datetimeFigureOut">
               <a:rPr lang="en-US" smtClean="0"/>
-              <a:t>9/21/2021</a:t>
+              <a:t>9/22/2021</a:t>
             </a:fld>
             <a:endParaRPr lang="en-US"/>
           </a:p>
@@ -4858,7 +4863,7 @@
           <a:p>
             <a:fld id="{691886E3-3C4E-4C73-96E9-00403812F84C}" type="datetimeFigureOut">
               <a:rPr lang="en-US" smtClean="0"/>
-              <a:t>9/21/2021</a:t>
+              <a:t>9/22/2021</a:t>
             </a:fld>
             <a:endParaRPr lang="en-US"/>
           </a:p>
@@ -5121,7 +5126,7 @@
           <a:p>
             <a:fld id="{691886E3-3C4E-4C73-96E9-00403812F84C}" type="datetimeFigureOut">
               <a:rPr lang="en-US" smtClean="0"/>
-              <a:t>9/21/2021</a:t>
+              <a:t>9/22/2021</a:t>
             </a:fld>
             <a:endParaRPr lang="en-US"/>
           </a:p>
@@ -5555,7 +5560,7 @@
           <a:p>
             <a:fld id="{691886E3-3C4E-4C73-96E9-00403812F84C}" type="datetimeFigureOut">
               <a:rPr lang="en-US" smtClean="0"/>
-              <a:t>9/21/2021</a:t>
+              <a:t>9/22/2021</a:t>
             </a:fld>
             <a:endParaRPr lang="en-US"/>
           </a:p>
@@ -6101,7 +6106,7 @@
           <a:p>
             <a:fld id="{691886E3-3C4E-4C73-96E9-00403812F84C}" type="datetimeFigureOut">
               <a:rPr lang="en-US" smtClean="0"/>
-              <a:t>9/21/2021</a:t>
+              <a:t>9/22/2021</a:t>
             </a:fld>
             <a:endParaRPr lang="en-US"/>
           </a:p>
@@ -6821,7 +6826,7 @@
           <a:p>
             <a:fld id="{691886E3-3C4E-4C73-96E9-00403812F84C}" type="datetimeFigureOut">
               <a:rPr lang="en-US" smtClean="0"/>
-              <a:t>9/21/2021</a:t>
+              <a:t>9/22/2021</a:t>
             </a:fld>
             <a:endParaRPr lang="en-US"/>
           </a:p>
@@ -6991,7 +6996,7 @@
           <a:p>
             <a:fld id="{691886E3-3C4E-4C73-96E9-00403812F84C}" type="datetimeFigureOut">
               <a:rPr lang="en-US" smtClean="0"/>
-              <a:t>9/21/2021</a:t>
+              <a:t>9/22/2021</a:t>
             </a:fld>
             <a:endParaRPr lang="en-US"/>
           </a:p>
@@ -7171,7 +7176,7 @@
           <a:p>
             <a:fld id="{691886E3-3C4E-4C73-96E9-00403812F84C}" type="datetimeFigureOut">
               <a:rPr lang="en-US" smtClean="0"/>
-              <a:t>9/21/2021</a:t>
+              <a:t>9/22/2021</a:t>
             </a:fld>
             <a:endParaRPr lang="en-US"/>
           </a:p>
@@ -7341,7 +7346,7 @@
           <a:p>
             <a:fld id="{691886E3-3C4E-4C73-96E9-00403812F84C}" type="datetimeFigureOut">
               <a:rPr lang="en-US" smtClean="0"/>
-              <a:t>9/21/2021</a:t>
+              <a:t>9/22/2021</a:t>
             </a:fld>
             <a:endParaRPr lang="en-US"/>
           </a:p>
@@ -7591,7 +7596,7 @@
           <a:p>
             <a:fld id="{691886E3-3C4E-4C73-96E9-00403812F84C}" type="datetimeFigureOut">
               <a:rPr lang="en-US" smtClean="0"/>
-              <a:t>9/21/2021</a:t>
+              <a:t>9/22/2021</a:t>
             </a:fld>
             <a:endParaRPr lang="en-US"/>
           </a:p>
@@ -7823,7 +7828,7 @@
           <a:p>
             <a:fld id="{691886E3-3C4E-4C73-96E9-00403812F84C}" type="datetimeFigureOut">
               <a:rPr lang="en-US" smtClean="0"/>
-              <a:t>9/21/2021</a:t>
+              <a:t>9/22/2021</a:t>
             </a:fld>
             <a:endParaRPr lang="en-US"/>
           </a:p>
@@ -8204,7 +8209,7 @@
           <a:p>
             <a:fld id="{691886E3-3C4E-4C73-96E9-00403812F84C}" type="datetimeFigureOut">
               <a:rPr lang="en-US" smtClean="0"/>
-              <a:t>9/21/2021</a:t>
+              <a:t>9/22/2021</a:t>
             </a:fld>
             <a:endParaRPr lang="en-US"/>
           </a:p>
@@ -8322,7 +8327,7 @@
           <a:p>
             <a:fld id="{691886E3-3C4E-4C73-96E9-00403812F84C}" type="datetimeFigureOut">
               <a:rPr lang="en-US" smtClean="0"/>
-              <a:t>9/21/2021</a:t>
+              <a:t>9/22/2021</a:t>
             </a:fld>
             <a:endParaRPr lang="en-US"/>
           </a:p>
@@ -8417,7 +8422,7 @@
           <a:p>
             <a:fld id="{691886E3-3C4E-4C73-96E9-00403812F84C}" type="datetimeFigureOut">
               <a:rPr lang="en-US" smtClean="0"/>
-              <a:t>9/21/2021</a:t>
+              <a:t>9/22/2021</a:t>
             </a:fld>
             <a:endParaRPr lang="en-US"/>
           </a:p>
@@ -8666,7 +8671,7 @@
           <a:p>
             <a:fld id="{691886E3-3C4E-4C73-96E9-00403812F84C}" type="datetimeFigureOut">
               <a:rPr lang="en-US" smtClean="0"/>
-              <a:t>9/21/2021</a:t>
+              <a:t>9/22/2021</a:t>
             </a:fld>
             <a:endParaRPr lang="en-US"/>
           </a:p>
@@ -8946,7 +8951,7 @@
           <a:p>
             <a:fld id="{691886E3-3C4E-4C73-96E9-00403812F84C}" type="datetimeFigureOut">
               <a:rPr lang="en-US" smtClean="0"/>
-              <a:t>9/21/2021</a:t>
+              <a:t>9/22/2021</a:t>
             </a:fld>
             <a:endParaRPr lang="en-US"/>
           </a:p>
@@ -9062,7 +9067,7 @@
           <a:noFill/>
           <a:extLst>
             <a:ext uri="{909E8E84-426E-40dd-AFC4-6F175D3DCCD1}">
-              <a14:hiddenFill xmlns:a14="http://schemas.microsoft.com/office/drawing/2010/main" xmlns="">
+              <a14:hiddenFill xmlns="" xmlns:a14="http://schemas.microsoft.com/office/drawing/2010/main">
                 <a:solidFill>
                   <a:srgbClr val="FFFFFF"/>
                 </a:solidFill>
@@ -9136,7 +9141,7 @@
               </a:ln>
               <a:extLst>
                 <a:ext uri="{91240B29-F687-4f45-9708-019B960494DF}">
-                  <a14:hiddenLine xmlns:a14="http://schemas.microsoft.com/office/drawing/2010/main" xmlns="" w="9525">
+                  <a14:hiddenLine xmlns="" xmlns:a14="http://schemas.microsoft.com/office/drawing/2010/main" w="9525">
                     <a:solidFill>
                       <a:srgbClr val="000000"/>
                     </a:solidFill>
@@ -9226,7 +9231,7 @@
               </a:ln>
               <a:extLst>
                 <a:ext uri="{91240B29-F687-4f45-9708-019B960494DF}">
-                  <a14:hiddenLine xmlns:a14="http://schemas.microsoft.com/office/drawing/2010/main" xmlns="" w="9525">
+                  <a14:hiddenLine xmlns="" xmlns:a14="http://schemas.microsoft.com/office/drawing/2010/main" w="9525">
                     <a:solidFill>
                       <a:srgbClr val="000000"/>
                     </a:solidFill>
@@ -9316,7 +9321,7 @@
               </a:ln>
               <a:extLst>
                 <a:ext uri="{91240B29-F687-4f45-9708-019B960494DF}">
-                  <a14:hiddenLine xmlns:a14="http://schemas.microsoft.com/office/drawing/2010/main" xmlns="" w="9525">
+                  <a14:hiddenLine xmlns="" xmlns:a14="http://schemas.microsoft.com/office/drawing/2010/main" w="9525">
                     <a:solidFill>
                       <a:srgbClr val="000000"/>
                     </a:solidFill>
@@ -9378,7 +9383,7 @@
               </a:ln>
               <a:extLst>
                 <a:ext uri="{91240B29-F687-4f45-9708-019B960494DF}">
-                  <a14:hiddenLine xmlns:a14="http://schemas.microsoft.com/office/drawing/2010/main" xmlns="" w="9525">
+                  <a14:hiddenLine xmlns="" xmlns:a14="http://schemas.microsoft.com/office/drawing/2010/main" w="9525">
                     <a:solidFill>
                       <a:srgbClr val="000000"/>
                     </a:solidFill>
@@ -9468,7 +9473,7 @@
               </a:ln>
               <a:extLst>
                 <a:ext uri="{91240B29-F687-4f45-9708-019B960494DF}">
-                  <a14:hiddenLine xmlns:a14="http://schemas.microsoft.com/office/drawing/2010/main" xmlns="" w="9525">
+                  <a14:hiddenLine xmlns="" xmlns:a14="http://schemas.microsoft.com/office/drawing/2010/main" w="9525">
                     <a:solidFill>
                       <a:srgbClr val="000000"/>
                     </a:solidFill>
@@ -9530,7 +9535,7 @@
               </a:ln>
               <a:extLst>
                 <a:ext uri="{91240B29-F687-4f45-9708-019B960494DF}">
-                  <a14:hiddenLine xmlns:a14="http://schemas.microsoft.com/office/drawing/2010/main" xmlns="" w="9525">
+                  <a14:hiddenLine xmlns="" xmlns:a14="http://schemas.microsoft.com/office/drawing/2010/main" w="9525">
                     <a:solidFill>
                       <a:srgbClr val="000000"/>
                     </a:solidFill>
@@ -9592,7 +9597,7 @@
               </a:ln>
               <a:extLst>
                 <a:ext uri="{91240B29-F687-4f45-9708-019B960494DF}">
-                  <a14:hiddenLine xmlns:a14="http://schemas.microsoft.com/office/drawing/2010/main" xmlns="" w="9525">
+                  <a14:hiddenLine xmlns="" xmlns:a14="http://schemas.microsoft.com/office/drawing/2010/main" w="9525">
                     <a:solidFill>
                       <a:srgbClr val="000000"/>
                     </a:solidFill>
@@ -9682,7 +9687,7 @@
               </a:ln>
               <a:extLst>
                 <a:ext uri="{91240B29-F687-4f45-9708-019B960494DF}">
-                  <a14:hiddenLine xmlns:a14="http://schemas.microsoft.com/office/drawing/2010/main" xmlns="" w="9525">
+                  <a14:hiddenLine xmlns="" xmlns:a14="http://schemas.microsoft.com/office/drawing/2010/main" w="9525">
                     <a:solidFill>
                       <a:srgbClr val="000000"/>
                     </a:solidFill>
@@ -9772,7 +9777,7 @@
               </a:ln>
               <a:extLst>
                 <a:ext uri="{91240B29-F687-4f45-9708-019B960494DF}">
-                  <a14:hiddenLine xmlns:a14="http://schemas.microsoft.com/office/drawing/2010/main" xmlns="" w="9525">
+                  <a14:hiddenLine xmlns="" xmlns:a14="http://schemas.microsoft.com/office/drawing/2010/main" w="9525">
                     <a:solidFill>
                       <a:srgbClr val="000000"/>
                     </a:solidFill>
@@ -9834,7 +9839,7 @@
               </a:ln>
               <a:extLst>
                 <a:ext uri="{91240B29-F687-4f45-9708-019B960494DF}">
-                  <a14:hiddenLine xmlns:a14="http://schemas.microsoft.com/office/drawing/2010/main" xmlns="" w="9525">
+                  <a14:hiddenLine xmlns="" xmlns:a14="http://schemas.microsoft.com/office/drawing/2010/main" w="9525">
                     <a:solidFill>
                       <a:srgbClr val="000000"/>
                     </a:solidFill>
@@ -9944,7 +9949,7 @@
               </a:ln>
               <a:extLst>
                 <a:ext uri="{91240B29-F687-4f45-9708-019B960494DF}">
-                  <a14:hiddenLine xmlns:a14="http://schemas.microsoft.com/office/drawing/2010/main" xmlns="" w="9525">
+                  <a14:hiddenLine xmlns="" xmlns:a14="http://schemas.microsoft.com/office/drawing/2010/main" w="9525">
                     <a:solidFill>
                       <a:srgbClr val="000000"/>
                     </a:solidFill>
@@ -10028,7 +10033,7 @@
               </a:ln>
               <a:extLst>
                 <a:ext uri="{91240B29-F687-4f45-9708-019B960494DF}">
-                  <a14:hiddenLine xmlns:a14="http://schemas.microsoft.com/office/drawing/2010/main" xmlns="" w="9525">
+                  <a14:hiddenLine xmlns="" xmlns:a14="http://schemas.microsoft.com/office/drawing/2010/main" w="9525">
                     <a:solidFill>
                       <a:srgbClr val="000000"/>
                     </a:solidFill>
@@ -10090,7 +10095,7 @@
               </a:ln>
               <a:extLst>
                 <a:ext uri="{91240B29-F687-4f45-9708-019B960494DF}">
-                  <a14:hiddenLine xmlns:a14="http://schemas.microsoft.com/office/drawing/2010/main" xmlns="" w="9525">
+                  <a14:hiddenLine xmlns="" xmlns:a14="http://schemas.microsoft.com/office/drawing/2010/main" w="9525">
                     <a:solidFill>
                       <a:srgbClr val="000000"/>
                     </a:solidFill>
@@ -10152,7 +10157,7 @@
               </a:ln>
               <a:extLst>
                 <a:ext uri="{91240B29-F687-4f45-9708-019B960494DF}">
-                  <a14:hiddenLine xmlns:a14="http://schemas.microsoft.com/office/drawing/2010/main" xmlns="" w="9525">
+                  <a14:hiddenLine xmlns="" xmlns:a14="http://schemas.microsoft.com/office/drawing/2010/main" w="9525">
                     <a:solidFill>
                       <a:srgbClr val="000000"/>
                     </a:solidFill>
@@ -10242,7 +10247,7 @@
               </a:ln>
               <a:extLst>
                 <a:ext uri="{91240B29-F687-4f45-9708-019B960494DF}">
-                  <a14:hiddenLine xmlns:a14="http://schemas.microsoft.com/office/drawing/2010/main" xmlns="" w="9525">
+                  <a14:hiddenLine xmlns="" xmlns:a14="http://schemas.microsoft.com/office/drawing/2010/main" w="9525">
                     <a:solidFill>
                       <a:srgbClr val="000000"/>
                     </a:solidFill>
@@ -10276,7 +10281,7 @@
               </a:ln>
               <a:extLst>
                 <a:ext uri="{91240B29-F687-4f45-9708-019B960494DF}">
-                  <a14:hiddenLine xmlns:a14="http://schemas.microsoft.com/office/drawing/2010/main" xmlns="" w="9525">
+                  <a14:hiddenLine xmlns="" xmlns:a14="http://schemas.microsoft.com/office/drawing/2010/main" w="9525">
                     <a:solidFill>
                       <a:srgbClr val="000000"/>
                     </a:solidFill>
@@ -10341,7 +10346,7 @@
               </a:ln>
               <a:extLst>
                 <a:ext uri="{91240B29-F687-4f45-9708-019B960494DF}">
-                  <a14:hiddenLine xmlns:a14="http://schemas.microsoft.com/office/drawing/2010/main" xmlns="" w="9525">
+                  <a14:hiddenLine xmlns="" xmlns:a14="http://schemas.microsoft.com/office/drawing/2010/main" w="9525">
                     <a:solidFill>
                       <a:srgbClr val="000000"/>
                     </a:solidFill>
@@ -10431,7 +10436,7 @@
               </a:ln>
               <a:extLst>
                 <a:ext uri="{91240B29-F687-4f45-9708-019B960494DF}">
-                  <a14:hiddenLine xmlns:a14="http://schemas.microsoft.com/office/drawing/2010/main" xmlns="" w="9525">
+                  <a14:hiddenLine xmlns="" xmlns:a14="http://schemas.microsoft.com/office/drawing/2010/main" w="9525">
                     <a:solidFill>
                       <a:srgbClr val="000000"/>
                     </a:solidFill>
@@ -10493,7 +10498,7 @@
               </a:ln>
               <a:extLst>
                 <a:ext uri="{91240B29-F687-4f45-9708-019B960494DF}">
-                  <a14:hiddenLine xmlns:a14="http://schemas.microsoft.com/office/drawing/2010/main" xmlns="" w="9525">
+                  <a14:hiddenLine xmlns="" xmlns:a14="http://schemas.microsoft.com/office/drawing/2010/main" w="9525">
                     <a:solidFill>
                       <a:srgbClr val="000000"/>
                     </a:solidFill>
@@ -10583,7 +10588,7 @@
               </a:ln>
               <a:extLst>
                 <a:ext uri="{91240B29-F687-4f45-9708-019B960494DF}">
-                  <a14:hiddenLine xmlns:a14="http://schemas.microsoft.com/office/drawing/2010/main" xmlns="" w="9525">
+                  <a14:hiddenLine xmlns="" xmlns:a14="http://schemas.microsoft.com/office/drawing/2010/main" w="9525">
                     <a:solidFill>
                       <a:srgbClr val="000000"/>
                     </a:solidFill>
@@ -10648,7 +10653,7 @@
               </a:ln>
               <a:extLst>
                 <a:ext uri="{91240B29-F687-4f45-9708-019B960494DF}">
-                  <a14:hiddenLine xmlns:a14="http://schemas.microsoft.com/office/drawing/2010/main" xmlns="" w="9525">
+                  <a14:hiddenLine xmlns="" xmlns:a14="http://schemas.microsoft.com/office/drawing/2010/main" w="9525">
                     <a:solidFill>
                       <a:srgbClr val="000000"/>
                     </a:solidFill>
@@ -10710,7 +10715,7 @@
               </a:ln>
               <a:extLst>
                 <a:ext uri="{91240B29-F687-4f45-9708-019B960494DF}">
-                  <a14:hiddenLine xmlns:a14="http://schemas.microsoft.com/office/drawing/2010/main" xmlns="" w="9525">
+                  <a14:hiddenLine xmlns="" xmlns:a14="http://schemas.microsoft.com/office/drawing/2010/main" w="9525">
                     <a:solidFill>
                       <a:srgbClr val="000000"/>
                     </a:solidFill>
@@ -10800,7 +10805,7 @@
               </a:ln>
               <a:extLst>
                 <a:ext uri="{91240B29-F687-4f45-9708-019B960494DF}">
-                  <a14:hiddenLine xmlns:a14="http://schemas.microsoft.com/office/drawing/2010/main" xmlns="" w="9525">
+                  <a14:hiddenLine xmlns="" xmlns:a14="http://schemas.microsoft.com/office/drawing/2010/main" w="9525">
                     <a:solidFill>
                       <a:srgbClr val="000000"/>
                     </a:solidFill>
@@ -10890,7 +10895,7 @@
               </a:ln>
               <a:extLst>
                 <a:ext uri="{91240B29-F687-4f45-9708-019B960494DF}">
-                  <a14:hiddenLine xmlns:a14="http://schemas.microsoft.com/office/drawing/2010/main" xmlns="" w="9525">
+                  <a14:hiddenLine xmlns="" xmlns:a14="http://schemas.microsoft.com/office/drawing/2010/main" w="9525">
                     <a:solidFill>
                       <a:srgbClr val="000000"/>
                     </a:solidFill>
@@ -10955,7 +10960,7 @@
               </a:ln>
               <a:extLst>
                 <a:ext uri="{91240B29-F687-4f45-9708-019B960494DF}">
-                  <a14:hiddenLine xmlns:a14="http://schemas.microsoft.com/office/drawing/2010/main" xmlns="" w="9525">
+                  <a14:hiddenLine xmlns="" xmlns:a14="http://schemas.microsoft.com/office/drawing/2010/main" w="9525">
                     <a:solidFill>
                       <a:srgbClr val="000000"/>
                     </a:solidFill>
@@ -11075,7 +11080,7 @@
               </a:ln>
               <a:extLst>
                 <a:ext uri="{91240B29-F687-4f45-9708-019B960494DF}">
-                  <a14:hiddenLine xmlns:a14="http://schemas.microsoft.com/office/drawing/2010/main" xmlns="" w="9525">
+                  <a14:hiddenLine xmlns="" xmlns:a14="http://schemas.microsoft.com/office/drawing/2010/main" w="9525">
                     <a:solidFill>
                       <a:srgbClr val="000000"/>
                     </a:solidFill>
@@ -11173,7 +11178,7 @@
               </a:ln>
               <a:extLst>
                 <a:ext uri="{91240B29-F687-4f45-9708-019B960494DF}">
-                  <a14:hiddenLine xmlns:a14="http://schemas.microsoft.com/office/drawing/2010/main" xmlns="" w="9525">
+                  <a14:hiddenLine xmlns="" xmlns:a14="http://schemas.microsoft.com/office/drawing/2010/main" w="9525">
                     <a:solidFill>
                       <a:srgbClr val="000000"/>
                     </a:solidFill>
@@ -11288,7 +11293,7 @@
               </a:ln>
               <a:extLst>
                 <a:ext uri="{91240B29-F687-4f45-9708-019B960494DF}">
-                  <a14:hiddenLine xmlns:a14="http://schemas.microsoft.com/office/drawing/2010/main" xmlns="" w="9525">
+                  <a14:hiddenLine xmlns="" xmlns:a14="http://schemas.microsoft.com/office/drawing/2010/main" w="9525">
                     <a:solidFill>
                       <a:srgbClr val="000000"/>
                     </a:solidFill>
@@ -11378,7 +11383,7 @@
               </a:ln>
               <a:extLst>
                 <a:ext uri="{91240B29-F687-4f45-9708-019B960494DF}">
-                  <a14:hiddenLine xmlns:a14="http://schemas.microsoft.com/office/drawing/2010/main" xmlns="" w="9525">
+                  <a14:hiddenLine xmlns="" xmlns:a14="http://schemas.microsoft.com/office/drawing/2010/main" w="9525">
                     <a:solidFill>
                       <a:srgbClr val="000000"/>
                     </a:solidFill>
@@ -11443,7 +11448,7 @@
               </a:ln>
               <a:extLst>
                 <a:ext uri="{91240B29-F687-4f45-9708-019B960494DF}">
-                  <a14:hiddenLine xmlns:a14="http://schemas.microsoft.com/office/drawing/2010/main" xmlns="" w="9525">
+                  <a14:hiddenLine xmlns="" xmlns:a14="http://schemas.microsoft.com/office/drawing/2010/main" w="9525">
                     <a:solidFill>
                       <a:srgbClr val="000000"/>
                     </a:solidFill>
@@ -11533,7 +11538,7 @@
               </a:ln>
               <a:extLst>
                 <a:ext uri="{91240B29-F687-4f45-9708-019B960494DF}">
-                  <a14:hiddenLine xmlns:a14="http://schemas.microsoft.com/office/drawing/2010/main" xmlns="" w="9525">
+                  <a14:hiddenLine xmlns="" xmlns:a14="http://schemas.microsoft.com/office/drawing/2010/main" w="9525">
                     <a:solidFill>
                       <a:srgbClr val="000000"/>
                     </a:solidFill>
@@ -11601,7 +11606,7 @@
               </a:ln>
               <a:extLst>
                 <a:ext uri="{91240B29-F687-4f45-9708-019B960494DF}">
-                  <a14:hiddenLine xmlns:a14="http://schemas.microsoft.com/office/drawing/2010/main" xmlns="" w="9525">
+                  <a14:hiddenLine xmlns="" xmlns:a14="http://schemas.microsoft.com/office/drawing/2010/main" w="9525">
                     <a:solidFill>
                       <a:srgbClr val="000000"/>
                     </a:solidFill>
@@ -11691,7 +11696,7 @@
               </a:ln>
               <a:extLst>
                 <a:ext uri="{91240B29-F687-4f45-9708-019B960494DF}">
-                  <a14:hiddenLine xmlns:a14="http://schemas.microsoft.com/office/drawing/2010/main" xmlns="" w="9525">
+                  <a14:hiddenLine xmlns="" xmlns:a14="http://schemas.microsoft.com/office/drawing/2010/main" w="9525">
                     <a:solidFill>
                       <a:srgbClr val="000000"/>
                     </a:solidFill>
@@ -11759,7 +11764,7 @@
               </a:ln>
               <a:extLst>
                 <a:ext uri="{91240B29-F687-4f45-9708-019B960494DF}">
-                  <a14:hiddenLine xmlns:a14="http://schemas.microsoft.com/office/drawing/2010/main" xmlns="" w="9525">
+                  <a14:hiddenLine xmlns="" xmlns:a14="http://schemas.microsoft.com/office/drawing/2010/main" w="9525">
                     <a:solidFill>
                       <a:srgbClr val="000000"/>
                     </a:solidFill>
@@ -11849,7 +11854,7 @@
               </a:ln>
               <a:extLst>
                 <a:ext uri="{91240B29-F687-4f45-9708-019B960494DF}">
-                  <a14:hiddenLine xmlns:a14="http://schemas.microsoft.com/office/drawing/2010/main" xmlns="" w="9525">
+                  <a14:hiddenLine xmlns="" xmlns:a14="http://schemas.microsoft.com/office/drawing/2010/main" w="9525">
                     <a:solidFill>
                       <a:srgbClr val="000000"/>
                     </a:solidFill>
@@ -11883,7 +11888,7 @@
               </a:ln>
               <a:extLst>
                 <a:ext uri="{91240B29-F687-4f45-9708-019B960494DF}">
-                  <a14:hiddenLine xmlns:a14="http://schemas.microsoft.com/office/drawing/2010/main" xmlns="" w="9525">
+                  <a14:hiddenLine xmlns="" xmlns:a14="http://schemas.microsoft.com/office/drawing/2010/main" w="9525">
                     <a:solidFill>
                       <a:srgbClr val="000000"/>
                     </a:solidFill>
@@ -12023,7 +12028,7 @@
           <a:p>
             <a:fld id="{691886E3-3C4E-4C73-96E9-00403812F84C}" type="datetimeFigureOut">
               <a:rPr lang="en-US" smtClean="0"/>
-              <a:t>9/21/2021</a:t>
+              <a:t>9/22/2021</a:t>
             </a:fld>
             <a:endParaRPr lang="en-US"/>
           </a:p>
@@ -12820,6 +12825,39 @@
           </a:p>
         </p:txBody>
       </p:sp>
+      <p:pic>
+        <p:nvPicPr>
+          <p:cNvPr id="4" name="Picture 3" descr="G:\RI\Projekat\pic03.JPG"/>
+          <p:cNvPicPr/>
+          <p:nvPr/>
+        </p:nvPicPr>
+        <p:blipFill>
+          <a:blip r:embed="rId2">
+            <a:extLst>
+              <a:ext uri="{28A0092B-C50C-407E-A947-70E740481C1C}">
+                <a14:useLocalDpi xmlns:a14="http://schemas.microsoft.com/office/drawing/2010/main" val="0"/>
+              </a:ext>
+            </a:extLst>
+          </a:blip>
+          <a:srcRect/>
+          <a:stretch>
+            <a:fillRect/>
+          </a:stretch>
+        </p:blipFill>
+        <p:spPr bwMode="auto">
+          <a:xfrm>
+            <a:off x="5545744" y="3036282"/>
+            <a:ext cx="4292600" cy="2713990"/>
+          </a:xfrm>
+          <a:prstGeom prst="rect">
+            <a:avLst/>
+          </a:prstGeom>
+          <a:noFill/>
+          <a:ln>
+            <a:noFill/>
+          </a:ln>
+        </p:spPr>
+      </p:pic>
     </p:spTree>
     <p:extLst>
       <p:ext uri="{BB962C8B-B14F-4D97-AF65-F5344CB8AC3E}">

</xml_diff>